<commit_message>
adding photo to slide
</commit_message>
<xml_diff>
--- a/welcome_dvla.pptx
+++ b/welcome_dvla.pptx
@@ -266,7 +266,7 @@
             <a:fld id="{363A4C4D-59EE-2246-8A8A-BC382FE15806}" type="datetimeFigureOut">
               <a:rPr lang="en-US"/>
               <a:pPr/>
-              <a:t>28/07/14</a:t>
+              <a:t>29/07/14</a:t>
             </a:fld>
             <a:endParaRPr lang="en-US"/>
           </a:p>
@@ -472,7 +472,7 @@
             <a:fld id="{74EB4956-4F27-264E-B23A-67A995E5F37F}" type="datetimeFigureOut">
               <a:rPr lang="en-US"/>
               <a:pPr/>
-              <a:t>28/07/14</a:t>
+              <a:t>29/07/14</a:t>
             </a:fld>
             <a:endParaRPr lang="en-US"/>
           </a:p>
@@ -13870,13 +13870,7 @@
               <a:rPr lang="en-US" dirty="0" smtClean="0">
                 <a:ea typeface="+mj-ea"/>
               </a:rPr>
-              <a:t>Replica </a:t>
-            </a:r>
-            <a:r>
-              <a:rPr lang="en-US" dirty="0" smtClean="0">
-                <a:ea typeface="+mj-ea"/>
-              </a:rPr>
-              <a:t>Sets – High Availability</a:t>
+              <a:t>Replica Sets – High Availability</a:t>
             </a:r>
             <a:endParaRPr lang="en-US" dirty="0">
               <a:ea typeface="+mj-ea"/>
@@ -16776,47 +16770,63 @@
           <a:chExt cx="0" cy="0"/>
         </a:xfrm>
       </p:grpSpPr>
+      <p:pic>
+        <p:nvPicPr>
+          <p:cNvPr id="10" name="Picture Placeholder 9" descr="photo1.jpg"/>
+          <p:cNvPicPr>
+            <a:picLocks noGrp="1" noChangeAspect="1"/>
+          </p:cNvPicPr>
+          <p:nvPr>
+            <p:ph type="pic" sz="quarter" idx="11"/>
+          </p:nvPr>
+        </p:nvPicPr>
+        <p:blipFill>
+          <a:blip r:embed="rId2">
+            <a:extLst>
+              <a:ext uri="{28A0092B-C50C-407E-A947-70E740481C1C}">
+                <a14:useLocalDpi xmlns:a14="http://schemas.microsoft.com/office/drawing/2010/main" val="0"/>
+              </a:ext>
+            </a:extLst>
+          </a:blip>
+          <a:srcRect t="5012" b="5012"/>
+          <a:stretch>
+            <a:fillRect/>
+          </a:stretch>
+        </p:blipFill>
+        <p:spPr>
+          <a:xfrm>
+            <a:off x="0" y="1"/>
+            <a:ext cx="9144000" cy="6993466"/>
+          </a:xfrm>
+        </p:spPr>
+      </p:pic>
       <p:sp>
         <p:nvSpPr>
-          <p:cNvPr id="2" name="Text Placeholder 1"/>
+          <p:cNvPr id="8" name="Title 7"/>
           <p:cNvSpPr>
             <a:spLocks noGrp="1"/>
           </p:cNvSpPr>
           <p:nvPr>
-            <p:ph type="body" sz="quarter" idx="13"/>
+            <p:ph type="title"/>
           </p:nvPr>
         </p:nvSpPr>
-        <p:spPr/>
+        <p:spPr>
+          <a:xfrm>
+            <a:off x="628403" y="2693267"/>
+            <a:ext cx="7898954" cy="1746659"/>
+          </a:xfrm>
+        </p:spPr>
         <p:txBody>
           <a:bodyPr/>
           <a:lstStyle/>
           <a:p>
             <a:r>
               <a:rPr lang="en-US" dirty="0" smtClean="0"/>
-              <a:t>You know what….</a:t>
-            </a:r>
-            <a:endParaRPr lang="en-US" dirty="0"/>
-          </a:p>
-        </p:txBody>
-      </p:sp>
-      <p:sp>
-        <p:nvSpPr>
-          <p:cNvPr id="3" name="Text Placeholder 2"/>
-          <p:cNvSpPr>
-            <a:spLocks noGrp="1"/>
-          </p:cNvSpPr>
-          <p:nvPr>
-            <p:ph type="body" sz="quarter" idx="14"/>
-          </p:nvPr>
-        </p:nvSpPr>
-        <p:spPr/>
-        <p:txBody>
-          <a:bodyPr/>
-          <a:lstStyle/>
-          <a:p>
-            <a:r>
-              <a:rPr lang="en-US" dirty="0" smtClean="0"/>
-              <a:t>Let’s just do it!</a:t>
+              <a:t>Mentioning </a:t>
+            </a:r>
+            <a:r>
+              <a:rPr lang="en-US" smtClean="0"/>
+              <a:t>Marks presentation …</a:t>
             </a:r>
             <a:endParaRPr lang="en-US" dirty="0"/>
           </a:p>
@@ -16987,33 +16997,19 @@
               <a:rPr lang="en-US" dirty="0" smtClean="0"/>
               <a:t>Matt Bates</a:t>
             </a:r>
-            <a:endParaRPr lang="en-US" dirty="0" smtClean="0"/>
           </a:p>
           <a:p>
             <a:pPr algn="l"/>
             <a:r>
               <a:rPr lang="en-US" dirty="0" smtClean="0"/>
-              <a:t>SA | </a:t>
-            </a:r>
-            <a:r>
-              <a:rPr lang="en-US" dirty="0" smtClean="0"/>
-              <a:t>CE</a:t>
-            </a:r>
-            <a:endParaRPr lang="en-US" dirty="0" smtClean="0"/>
+              <a:t>SA | CE</a:t>
+            </a:r>
           </a:p>
           <a:p>
             <a:pPr algn="l"/>
             <a:r>
               <a:rPr lang="en-US" dirty="0" err="1" smtClean="0"/>
-              <a:t>matt</a:t>
-            </a:r>
-            <a:r>
-              <a:rPr lang="en-US" dirty="0" err="1" smtClean="0"/>
-              <a:t>@</a:t>
-            </a:r>
-            <a:r>
-              <a:rPr lang="en-US" dirty="0" err="1" smtClean="0"/>
-              <a:t>mongodb.com</a:t>
+              <a:t>matt@mongodb.com</a:t>
             </a:r>
             <a:endParaRPr lang="en-US" dirty="0" smtClean="0"/>
           </a:p>
@@ -17788,24 +17784,7 @@
                 <a:ea typeface="ＭＳ Ｐゴシック" charset="0"/>
                 <a:cs typeface="Segoe Semibold" charset="0"/>
               </a:rPr>
-              <a:t>200</a:t>
-            </a:r>
-            <a:r>
-              <a:rPr lang="en-US" dirty="0" smtClean="0">
-                <a:solidFill>
-                  <a:schemeClr val="bg1"/>
-                </a:solidFill>
-                <a:effectLst>
-                  <a:outerShdw blurRad="50800" dist="38100" dir="2700000" algn="tl" rotWithShape="0">
-                    <a:srgbClr val="000000">
-                      <a:alpha val="43000"/>
-                    </a:srgbClr>
-                  </a:outerShdw>
-                </a:effectLst>
-                <a:ea typeface="ＭＳ Ｐゴシック" charset="0"/>
-                <a:cs typeface="Segoe Semibold" charset="0"/>
-              </a:rPr>
-              <a:t>,000</a:t>
+              <a:t>200,000</a:t>
             </a:r>
             <a:r>
               <a:rPr lang="en-US" dirty="0">

</xml_diff>